<commit_message>
Updated PPT (final as presented)
</commit_message>
<xml_diff>
--- a/docs/CloudStash.pptx
+++ b/docs/CloudStash.pptx
@@ -17,10 +17,11 @@
     <p:sldId id="391" r:id="rId11"/>
     <p:sldId id="390" r:id="rId12"/>
     <p:sldId id="397" r:id="rId13"/>
-    <p:sldId id="396" r:id="rId14"/>
-    <p:sldId id="395" r:id="rId15"/>
-    <p:sldId id="394" r:id="rId16"/>
-    <p:sldId id="398" r:id="rId17"/>
+    <p:sldId id="399" r:id="rId14"/>
+    <p:sldId id="396" r:id="rId15"/>
+    <p:sldId id="395" r:id="rId16"/>
+    <p:sldId id="394" r:id="rId17"/>
+    <p:sldId id="398" r:id="rId18"/>
   </p:sldIdLst>
   <p:sldSz cx="12192000" cy="6858000"/>
   <p:notesSz cx="6858000" cy="9144000"/>
@@ -136,6 +137,7 @@
             <p14:sldId id="391"/>
             <p14:sldId id="390"/>
             <p14:sldId id="397"/>
+            <p14:sldId id="399"/>
             <p14:sldId id="396"/>
             <p14:sldId id="395"/>
             <p14:sldId id="394"/>
@@ -6281,7 +6283,7 @@
           <a:p>
             <a:pPr algn="ctr"/>
             <a:r>
-              <a:rPr lang="en-US" sz="2800" smtClean="0"/>
+              <a:rPr lang="en-US" sz="2800" dirty="0" smtClean="0"/>
               <a:t>August </a:t>
             </a:r>
             <a:r>
@@ -6289,7 +6291,7 @@
               <a:t>4</a:t>
             </a:r>
             <a:r>
-              <a:rPr lang="en-US" sz="2800" smtClean="0"/>
+              <a:rPr lang="en-US" sz="2800" dirty="0" smtClean="0"/>
               <a:t> </a:t>
             </a:r>
             <a:r>
@@ -6486,6 +6488,13 @@
   <p:clrMapOvr>
     <a:masterClrMapping/>
   </p:clrMapOvr>
+  <p:timing>
+    <p:tnLst>
+      <p:par>
+        <p:cTn id="1" dur="indefinite" restart="never" nodeType="tmRoot"/>
+      </p:par>
+    </p:tnLst>
+  </p:timing>
 </p:sld>
 </file>
 
@@ -6589,6 +6598,13 @@
   <p:clrMapOvr>
     <a:masterClrMapping/>
   </p:clrMapOvr>
+  <p:timing>
+    <p:tnLst>
+      <p:par>
+        <p:cTn id="1" dur="indefinite" restart="never" nodeType="tmRoot"/>
+      </p:par>
+    </p:tnLst>
+  </p:timing>
 </p:sld>
 </file>
 
@@ -6689,6 +6705,13 @@
   <p:clrMapOvr>
     <a:masterClrMapping/>
   </p:clrMapOvr>
+  <p:timing>
+    <p:tnLst>
+      <p:par>
+        <p:cTn id="1" dur="indefinite" restart="never" nodeType="tmRoot"/>
+      </p:par>
+    </p:tnLst>
+  </p:timing>
 </p:sld>
 </file>
 
@@ -6719,33 +6742,10 @@
             <p:ph type="title"/>
           </p:nvPr>
         </p:nvSpPr>
-        <p:spPr/>
-        <p:txBody>
-          <a:bodyPr/>
-          <a:lstStyle/>
-          <a:p>
-            <a:r>
-              <a:rPr lang="en-US" dirty="0" smtClean="0"/>
-              <a:t>Testing/Verification	</a:t>
-            </a:r>
-            <a:endParaRPr lang="en-US" dirty="0"/>
-          </a:p>
-        </p:txBody>
-      </p:sp>
-      <p:sp>
-        <p:nvSpPr>
-          <p:cNvPr id="3" name="Content Placeholder 2"/>
-          <p:cNvSpPr>
-            <a:spLocks noGrp="1"/>
-          </p:cNvSpPr>
-          <p:nvPr>
-            <p:ph idx="1"/>
-          </p:nvPr>
-        </p:nvSpPr>
         <p:spPr>
           <a:xfrm>
-            <a:off x="3055172" y="2086085"/>
-            <a:ext cx="8135879" cy="3766074"/>
+            <a:off x="1484311" y="94130"/>
+            <a:ext cx="10018713" cy="1752599"/>
           </a:xfrm>
         </p:spPr>
         <p:txBody>
@@ -6754,33 +6754,111 @@
           <a:p>
             <a:r>
               <a:rPr lang="en-US" dirty="0" smtClean="0"/>
-              <a:t>Over 100 unit tests (2,000+ lines of test code)</a:t>
-            </a:r>
-          </a:p>
+              <a:t>Implementation Details</a:t>
+            </a:r>
+            <a:endParaRPr lang="en-US" dirty="0"/>
+          </a:p>
+        </p:txBody>
+      </p:sp>
+      <p:sp>
+        <p:nvSpPr>
+          <p:cNvPr id="3" name="Content Placeholder 2"/>
+          <p:cNvSpPr>
+            <a:spLocks noGrp="1"/>
+          </p:cNvSpPr>
+          <p:nvPr>
+            <p:ph idx="1"/>
+          </p:nvPr>
+        </p:nvSpPr>
+        <p:spPr>
+          <a:xfrm>
+            <a:off x="2485016" y="1506071"/>
+            <a:ext cx="9499002" cy="4916244"/>
+          </a:xfrm>
+        </p:spPr>
+        <p:txBody>
+          <a:bodyPr>
+            <a:normAutofit fontScale="92500" lnSpcReduction="10000"/>
+          </a:bodyPr>
+          <a:lstStyle/>
           <a:p>
             <a:r>
               <a:rPr lang="en-US" dirty="0" smtClean="0"/>
-              <a:t>Unit tests can be run against any driver</a:t>
+              <a:t>Stateless and Independent</a:t>
             </a:r>
           </a:p>
           <a:p>
             <a:pPr lvl="1"/>
             <a:r>
               <a:rPr lang="en-US" dirty="0" smtClean="0"/>
-              <a:t>Currently either local file store or Manta</a:t>
-            </a:r>
-          </a:p>
-          <a:p>
+              <a:t>All State is maintained in the underlying store (file upload fragments, job status files, </a:t>
+            </a:r>
+            <a:r>
+              <a:rPr lang="en-US" dirty="0" err="1" smtClean="0"/>
+              <a:t>etc</a:t>
+            </a:r>
             <a:r>
               <a:rPr lang="en-US" dirty="0" smtClean="0"/>
-              <a:t>Manual test/verification through Dropbox client APIs</a:t>
+              <a:t>), all on a per-user basis</a:t>
             </a:r>
           </a:p>
           <a:p>
             <a:pPr lvl="1"/>
             <a:r>
               <a:rPr lang="en-US" dirty="0" smtClean="0"/>
-              <a:t>Java/Android and JavaScript APIs</a:t>
+              <a:t>No cache data is used and there is no session affinity requirement (any instance of CloudStash can handle any API call for any user)</a:t>
+            </a:r>
+          </a:p>
+          <a:p>
+            <a:pPr lvl="1"/>
+            <a:r>
+              <a:rPr lang="en-US" dirty="0" err="1" smtClean="0"/>
+              <a:t>Auth</a:t>
+            </a:r>
+            <a:r>
+              <a:rPr lang="en-US" dirty="0" smtClean="0"/>
+              <a:t> token contains enough information that there is no need to phone home on a per-request basis</a:t>
+            </a:r>
+          </a:p>
+          <a:p>
+            <a:r>
+              <a:rPr lang="en-US" dirty="0" smtClean="0"/>
+              <a:t>Streaming</a:t>
+            </a:r>
+          </a:p>
+          <a:p>
+            <a:pPr lvl="1"/>
+            <a:r>
+              <a:rPr lang="en-US" dirty="0" smtClean="0"/>
+              <a:t>All file upload/download operations are streamed asynchronously through CloudStash (no file is ever held in memory)</a:t>
+            </a:r>
+          </a:p>
+          <a:p>
+            <a:r>
+              <a:rPr lang="en-US" dirty="0" smtClean="0"/>
+              <a:t>Asynchronous</a:t>
+            </a:r>
+          </a:p>
+          <a:p>
+            <a:pPr lvl="1"/>
+            <a:r>
+              <a:rPr lang="en-US" dirty="0" smtClean="0"/>
+              <a:t>All multi-object and directory traversal operations are processed in parallel</a:t>
+            </a:r>
+          </a:p>
+          <a:p>
+            <a:pPr lvl="1"/>
+            <a:r>
+              <a:rPr lang="en-US" dirty="0" smtClean="0"/>
+              <a:t>Maximum concurrency per operation can be specified in </a:t>
+            </a:r>
+            <a:r>
+              <a:rPr lang="en-US" dirty="0" err="1" smtClean="0"/>
+              <a:t>config</a:t>
+            </a:r>
+            <a:r>
+              <a:rPr lang="en-US" dirty="0" smtClean="0"/>
+              <a:t> for tuning purposes</a:t>
             </a:r>
             <a:endParaRPr lang="en-US" dirty="0"/>
           </a:p>
@@ -6789,13 +6867,20 @@
     </p:spTree>
     <p:extLst>
       <p:ext uri="{BB962C8B-B14F-4D97-AF65-F5344CB8AC3E}">
-        <p14:creationId xmlns:p14="http://schemas.microsoft.com/office/powerpoint/2010/main" val="307683391"/>
+        <p14:creationId xmlns:p14="http://schemas.microsoft.com/office/powerpoint/2010/main" val="109827426"/>
       </p:ext>
     </p:extLst>
   </p:cSld>
   <p:clrMapOvr>
     <a:masterClrMapping/>
   </p:clrMapOvr>
+  <p:timing>
+    <p:tnLst>
+      <p:par>
+        <p:cTn id="1" dur="indefinite" restart="never" nodeType="tmRoot"/>
+      </p:par>
+    </p:tnLst>
+  </p:timing>
 </p:sld>
 </file>
 
@@ -6833,7 +6918,7 @@
           <a:p>
             <a:r>
               <a:rPr lang="en-US" dirty="0" smtClean="0"/>
-              <a:t>Demo</a:t>
+              <a:t>Testing/Verification	</a:t>
             </a:r>
             <a:endParaRPr lang="en-US" dirty="0"/>
           </a:p>
@@ -6851,76 +6936,43 @@
         </p:nvSpPr>
         <p:spPr>
           <a:xfrm>
-            <a:off x="2689413" y="2139875"/>
-            <a:ext cx="8294146" cy="4191001"/>
+            <a:off x="3055172" y="2086085"/>
+            <a:ext cx="8135879" cy="3766074"/>
           </a:xfrm>
         </p:spPr>
         <p:txBody>
-          <a:bodyPr>
-            <a:normAutofit/>
-          </a:bodyPr>
+          <a:bodyPr/>
           <a:lstStyle/>
           <a:p>
             <a:r>
               <a:rPr lang="en-US" dirty="0" smtClean="0"/>
-              <a:t>Dropbox Android sample app</a:t>
-            </a:r>
-          </a:p>
-          <a:p>
-            <a:r>
-              <a:rPr lang="en-US" dirty="0" err="1" smtClean="0"/>
-              <a:t>CloudStashUX</a:t>
-            </a:r>
-            <a:endParaRPr lang="en-US" dirty="0" smtClean="0"/>
+              <a:t>Over 100 unit tests (2,000+ lines of test code)</a:t>
+            </a:r>
+          </a:p>
+          <a:p>
+            <a:r>
+              <a:rPr lang="en-US" dirty="0" smtClean="0"/>
+              <a:t>Unit tests can be run against any driver</a:t>
+            </a:r>
           </a:p>
           <a:p>
             <a:pPr lvl="1"/>
             <a:r>
-              <a:rPr lang="en-US" dirty="0"/>
-              <a:t>I</a:t>
-            </a:r>
-            <a:r>
               <a:rPr lang="en-US" dirty="0" smtClean="0"/>
-              <a:t>n-house web app implemented in Node.js (Express, Bootstrap, Handlebars)</a:t>
+              <a:t>Currently either local file store or Manta</a:t>
             </a:r>
           </a:p>
           <a:p>
             <a:r>
               <a:rPr lang="en-US" dirty="0" smtClean="0"/>
-              <a:t>Either app can talk to Dropbox server or CloudStash server with the same client code</a:t>
-            </a:r>
-          </a:p>
-          <a:p>
+              <a:t>Manual test/verification through Dropbox client APIs</a:t>
+            </a:r>
+          </a:p>
+          <a:p>
+            <a:pPr lvl="1"/>
             <a:r>
               <a:rPr lang="en-US" dirty="0" smtClean="0"/>
-              <a:t>CloudStash currently running live:</a:t>
-            </a:r>
-          </a:p>
-          <a:p>
-            <a:pPr lvl="1"/>
-            <a:r>
-              <a:rPr lang="en-US" dirty="0" smtClean="0"/>
-              <a:t>API on Triton/Manta - </a:t>
-            </a:r>
-            <a:r>
-              <a:rPr lang="en-US" dirty="0" smtClean="0">
-                <a:hlinkClick r:id="rId2"/>
-              </a:rPr>
-              <a:t>https://api.cloudstash.net</a:t>
-            </a:r>
-            <a:endParaRPr lang="en-US" dirty="0" smtClean="0"/>
-          </a:p>
-          <a:p>
-            <a:pPr lvl="1"/>
-            <a:r>
-              <a:rPr lang="en-US" dirty="0" smtClean="0"/>
-              <a:t>UX on Triton - </a:t>
-            </a:r>
-            <a:r>
-              <a:rPr lang="en-US" dirty="0" smtClean="0">
-                <a:hlinkClick r:id="rId3"/>
-              </a:rPr>
-              <a:t>https://www.cloudstash.net</a:t>
+              <a:t>Java/Android, JavaScript, and Python APIs</a:t>
             </a:r>
             <a:endParaRPr lang="en-US" dirty="0"/>
           </a:p>
@@ -6929,13 +6981,20 @@
     </p:spTree>
     <p:extLst>
       <p:ext uri="{BB962C8B-B14F-4D97-AF65-F5344CB8AC3E}">
-        <p14:creationId xmlns:p14="http://schemas.microsoft.com/office/powerpoint/2010/main" val="623951031"/>
+        <p14:creationId xmlns:p14="http://schemas.microsoft.com/office/powerpoint/2010/main" val="307683391"/>
       </p:ext>
     </p:extLst>
   </p:cSld>
   <p:clrMapOvr>
     <a:masterClrMapping/>
   </p:clrMapOvr>
+  <p:timing>
+    <p:tnLst>
+      <p:par>
+        <p:cTn id="1" dur="indefinite" restart="never" nodeType="tmRoot"/>
+      </p:par>
+    </p:tnLst>
+  </p:timing>
 </p:sld>
 </file>
 
@@ -6973,7 +7032,7 @@
           <a:p>
             <a:r>
               <a:rPr lang="en-US" dirty="0" smtClean="0"/>
-              <a:t>Optimizing for Manta</a:t>
+              <a:t>Demo</a:t>
             </a:r>
             <a:endParaRPr lang="en-US" dirty="0"/>
           </a:p>
@@ -6991,29 +7050,76 @@
         </p:nvSpPr>
         <p:spPr>
           <a:xfrm>
-            <a:off x="1893346" y="2216075"/>
-            <a:ext cx="9609678" cy="3765177"/>
+            <a:off x="2689413" y="2139875"/>
+            <a:ext cx="8294146" cy="4191001"/>
           </a:xfrm>
         </p:spPr>
         <p:txBody>
-          <a:bodyPr/>
+          <a:bodyPr>
+            <a:normAutofit/>
+          </a:bodyPr>
           <a:lstStyle/>
           <a:p>
             <a:r>
               <a:rPr lang="en-US" dirty="0" smtClean="0"/>
-              <a:t>All implemented API functionality works on Manta today (even multipart upload)</a:t>
-            </a:r>
-          </a:p>
-          <a:p>
+              <a:t>Dropbox Android sample app</a:t>
+            </a:r>
+          </a:p>
+          <a:p>
+            <a:r>
+              <a:rPr lang="en-US" dirty="0" err="1" smtClean="0"/>
+              <a:t>CloudStashUX</a:t>
+            </a:r>
+            <a:endParaRPr lang="en-US" dirty="0" smtClean="0"/>
+          </a:p>
+          <a:p>
+            <a:pPr lvl="1"/>
+            <a:r>
+              <a:rPr lang="en-US" dirty="0"/>
+              <a:t>I</a:t>
+            </a:r>
             <a:r>
               <a:rPr lang="en-US" dirty="0" smtClean="0"/>
-              <a:t>We’ve identified key points where Manta could be extended to greatly enhance efficiency of certain API operations</a:t>
+              <a:t>n-house web app implemented in Node.js (Express, Bootstrap, Handlebars)</a:t>
             </a:r>
           </a:p>
           <a:p>
             <a:r>
               <a:rPr lang="en-US" dirty="0" smtClean="0"/>
-              <a:t>If those changes were made, we would simply add the optional driver API implementations to the Manta driver (no changes to underlying API engine logic required)</a:t>
+              <a:t>Either app can talk to Dropbox server or CloudStash server with the same client code</a:t>
+            </a:r>
+          </a:p>
+          <a:p>
+            <a:r>
+              <a:rPr lang="en-US" dirty="0" smtClean="0"/>
+              <a:t>CloudStash currently running live:</a:t>
+            </a:r>
+          </a:p>
+          <a:p>
+            <a:pPr lvl="1"/>
+            <a:r>
+              <a:rPr lang="en-US" dirty="0" smtClean="0"/>
+              <a:t>API on Triton/Manta - </a:t>
+            </a:r>
+            <a:r>
+              <a:rPr lang="en-US" dirty="0" smtClean="0">
+                <a:hlinkClick r:id="rId2"/>
+              </a:rPr>
+              <a:t>https://api.cloudstash.net</a:t>
+            </a:r>
+            <a:endParaRPr lang="en-US" dirty="0" smtClean="0"/>
+          </a:p>
+          <a:p>
+            <a:pPr lvl="1"/>
+            <a:r>
+              <a:rPr lang="en-US" dirty="0" smtClean="0"/>
+              <a:t>UX on Triton - </a:t>
+            </a:r>
+            <a:r>
+              <a:rPr lang="en-US" dirty="0" smtClean="0">
+                <a:hlinkClick r:id="rId3"/>
+              </a:rPr>
+              <a:t>https://www.cloudstash.net</a:t>
             </a:r>
             <a:endParaRPr lang="en-US" dirty="0"/>
           </a:p>
@@ -7022,13 +7128,20 @@
     </p:spTree>
     <p:extLst>
       <p:ext uri="{BB962C8B-B14F-4D97-AF65-F5344CB8AC3E}">
-        <p14:creationId xmlns:p14="http://schemas.microsoft.com/office/powerpoint/2010/main" val="1702298979"/>
+        <p14:creationId xmlns:p14="http://schemas.microsoft.com/office/powerpoint/2010/main" val="623951031"/>
       </p:ext>
     </p:extLst>
   </p:cSld>
   <p:clrMapOvr>
     <a:masterClrMapping/>
   </p:clrMapOvr>
+  <p:timing>
+    <p:tnLst>
+      <p:par>
+        <p:cTn id="1" dur="indefinite" restart="never" nodeType="tmRoot"/>
+      </p:par>
+    </p:tnLst>
+  </p:timing>
 </p:sld>
 </file>
 
@@ -7059,6 +7172,106 @@
             <p:ph type="title"/>
           </p:nvPr>
         </p:nvSpPr>
+        <p:spPr/>
+        <p:txBody>
+          <a:bodyPr/>
+          <a:lstStyle/>
+          <a:p>
+            <a:r>
+              <a:rPr lang="en-US" dirty="0" smtClean="0"/>
+              <a:t>Optimizing for Manta</a:t>
+            </a:r>
+            <a:endParaRPr lang="en-US" dirty="0"/>
+          </a:p>
+        </p:txBody>
+      </p:sp>
+      <p:sp>
+        <p:nvSpPr>
+          <p:cNvPr id="3" name="Content Placeholder 2"/>
+          <p:cNvSpPr>
+            <a:spLocks noGrp="1"/>
+          </p:cNvSpPr>
+          <p:nvPr>
+            <p:ph idx="1"/>
+          </p:nvPr>
+        </p:nvSpPr>
+        <p:spPr>
+          <a:xfrm>
+            <a:off x="1893346" y="2216075"/>
+            <a:ext cx="9609678" cy="3765177"/>
+          </a:xfrm>
+        </p:spPr>
+        <p:txBody>
+          <a:bodyPr/>
+          <a:lstStyle/>
+          <a:p>
+            <a:r>
+              <a:rPr lang="en-US" dirty="0" smtClean="0"/>
+              <a:t>All implemented API functionality works on Manta today (even multipart upload)</a:t>
+            </a:r>
+          </a:p>
+          <a:p>
+            <a:r>
+              <a:rPr lang="en-US" dirty="0" smtClean="0"/>
+              <a:t>We’ve identified key points where Manta could be extended to greatly enhance efficiency of certain API operations</a:t>
+            </a:r>
+          </a:p>
+          <a:p>
+            <a:r>
+              <a:rPr lang="en-US" dirty="0" smtClean="0"/>
+              <a:t>If those changes were made, we would simply add the optional driver API implementations to the Manta driver (no changes to underlying API engine logic required)</a:t>
+            </a:r>
+            <a:endParaRPr lang="en-US" dirty="0"/>
+          </a:p>
+        </p:txBody>
+      </p:sp>
+    </p:spTree>
+    <p:extLst>
+      <p:ext uri="{BB962C8B-B14F-4D97-AF65-F5344CB8AC3E}">
+        <p14:creationId xmlns:p14="http://schemas.microsoft.com/office/powerpoint/2010/main" val="1702298979"/>
+      </p:ext>
+    </p:extLst>
+  </p:cSld>
+  <p:clrMapOvr>
+    <a:masterClrMapping/>
+  </p:clrMapOvr>
+  <p:timing>
+    <p:tnLst>
+      <p:par>
+        <p:cTn id="1" dur="indefinite" restart="never" nodeType="tmRoot"/>
+      </p:par>
+    </p:tnLst>
+  </p:timing>
+</p:sld>
+</file>
+
+<file path=ppt/slides/slide17.xml><?xml version="1.0" encoding="utf-8"?>
+<p:sld xmlns:a="http://schemas.openxmlformats.org/drawingml/2006/main" xmlns:r="http://schemas.openxmlformats.org/officeDocument/2006/relationships" xmlns:p="http://schemas.openxmlformats.org/presentationml/2006/main">
+  <p:cSld>
+    <p:spTree>
+      <p:nvGrpSpPr>
+        <p:cNvPr id="1" name=""/>
+        <p:cNvGrpSpPr/>
+        <p:nvPr/>
+      </p:nvGrpSpPr>
+      <p:grpSpPr>
+        <a:xfrm>
+          <a:off x="0" y="0"/>
+          <a:ext cx="0" cy="0"/>
+          <a:chOff x="0" y="0"/>
+          <a:chExt cx="0" cy="0"/>
+        </a:xfrm>
+      </p:grpSpPr>
+      <p:sp>
+        <p:nvSpPr>
+          <p:cNvPr id="2" name="Title 1"/>
+          <p:cNvSpPr>
+            <a:spLocks noGrp="1"/>
+          </p:cNvSpPr>
+          <p:nvPr>
+            <p:ph type="title"/>
+          </p:nvPr>
+        </p:nvSpPr>
         <p:spPr>
           <a:xfrm>
             <a:off x="1484311" y="2417781"/>
@@ -7087,6 +7300,13 @@
   <p:clrMapOvr>
     <a:masterClrMapping/>
   </p:clrMapOvr>
+  <p:timing>
+    <p:tnLst>
+      <p:par>
+        <p:cTn id="1" dur="indefinite" restart="never" nodeType="tmRoot"/>
+      </p:par>
+    </p:tnLst>
+  </p:timing>
 </p:sld>
 </file>
 
@@ -7805,6 +8025,13 @@
   <p:clrMapOvr>
     <a:masterClrMapping/>
   </p:clrMapOvr>
+  <p:timing>
+    <p:tnLst>
+      <p:par>
+        <p:cTn id="1" dur="indefinite" restart="never" nodeType="tmRoot"/>
+      </p:par>
+    </p:tnLst>
+  </p:timing>
 </p:sld>
 </file>
 
@@ -7974,6 +8201,13 @@
   <p:clrMapOvr>
     <a:masterClrMapping/>
   </p:clrMapOvr>
+  <p:timing>
+    <p:tnLst>
+      <p:par>
+        <p:cTn id="1" dur="indefinite" restart="never" nodeType="tmRoot"/>
+      </p:par>
+    </p:tnLst>
+  </p:timing>
 </p:sld>
 </file>
 
@@ -8105,6 +8339,13 @@
   <p:clrMapOvr>
     <a:masterClrMapping/>
   </p:clrMapOvr>
+  <p:timing>
+    <p:tnLst>
+      <p:par>
+        <p:cTn id="1" dur="indefinite" restart="never" nodeType="tmRoot"/>
+      </p:par>
+    </p:tnLst>
+  </p:timing>
 </p:sld>
 </file>
 
@@ -8229,6 +8470,13 @@
   <p:clrMapOvr>
     <a:masterClrMapping/>
   </p:clrMapOvr>
+  <p:timing>
+    <p:tnLst>
+      <p:par>
+        <p:cTn id="1" dur="indefinite" restart="never" nodeType="tmRoot"/>
+      </p:par>
+    </p:tnLst>
+  </p:timing>
 </p:sld>
 </file>
 
@@ -8350,6 +8598,13 @@
   <p:clrMapOvr>
     <a:masterClrMapping/>
   </p:clrMapOvr>
+  <p:timing>
+    <p:tnLst>
+      <p:par>
+        <p:cTn id="1" dur="indefinite" restart="never" nodeType="tmRoot"/>
+      </p:par>
+    </p:tnLst>
+  </p:timing>
 </p:sld>
 </file>
 
@@ -8465,6 +8720,13 @@
   <p:clrMapOvr>
     <a:masterClrMapping/>
   </p:clrMapOvr>
+  <p:timing>
+    <p:tnLst>
+      <p:par>
+        <p:cTn id="1" dur="indefinite" restart="never" nodeType="tmRoot"/>
+      </p:par>
+    </p:tnLst>
+  </p:timing>
 </p:sld>
 </file>
 
@@ -8579,6 +8841,13 @@
   <p:clrMapOvr>
     <a:masterClrMapping/>
   </p:clrMapOvr>
+  <p:timing>
+    <p:tnLst>
+      <p:par>
+        <p:cTn id="1" dur="indefinite" restart="never" nodeType="tmRoot"/>
+      </p:par>
+    </p:tnLst>
+  </p:timing>
 </p:sld>
 </file>
 
@@ -8678,6 +8947,13 @@
   <p:clrMapOvr>
     <a:masterClrMapping/>
   </p:clrMapOvr>
+  <p:timing>
+    <p:tnLst>
+      <p:par>
+        <p:cTn id="1" dur="indefinite" restart="never" nodeType="tmRoot"/>
+      </p:par>
+    </p:tnLst>
+  </p:timing>
 </p:sld>
 </file>
 

</xml_diff>